<commit_message>
Change receiver.h, but undefined atomicAdd
</commit_message>
<xml_diff>
--- a/docs/Scene/SceneExplanation.pptx
+++ b/docs/Scene/SceneExplanation.pptx
@@ -141,6 +141,9 @@
         </p15:guide>
       </p15:sldGuideLst>
     </p:ext>
+    <p:ext uri="{2D200454-40CA-4A62-9FC3-DE9A4176ACB9}">
+      <p15:notesGuideLst xmlns:p15="http://schemas.microsoft.com/office/powerpoint/2012/main"/>
+    </p:ext>
   </p:extLst>
 </p:presentation>
 </file>
@@ -243,7 +246,7 @@
           <a:p>
             <a:fld id="{6D7FE9F8-2CA7-468D-9335-DE6E4EE2CFE0}" type="datetimeFigureOut">
               <a:rPr lang="zh-CN" altLang="en-US" smtClean="0"/>
-              <a:t>2017/10/11</a:t>
+              <a:t>2017/10/13</a:t>
             </a:fld>
             <a:endParaRPr lang="zh-CN" altLang="en-US"/>
           </a:p>
@@ -420,7 +423,7 @@
           <a:p>
             <a:fld id="{2E3B1B48-C3D3-44FD-8F18-EE819032FA56}" type="datetimeFigureOut">
               <a:rPr lang="zh-CN" altLang="en-US" smtClean="0"/>
-              <a:t>2017/10/11</a:t>
+              <a:t>2017/10/13</a:t>
             </a:fld>
             <a:endParaRPr lang="zh-CN" altLang="en-US"/>
           </a:p>
@@ -881,7 +884,7 @@
           <a:p>
             <a:fld id="{9082C258-E36B-4428-9EBE-3D66F397061D}" type="datetime1">
               <a:rPr lang="zh-CN" altLang="en-US" smtClean="0"/>
-              <a:t>2017/10/11</a:t>
+              <a:t>2017/10/13</a:t>
             </a:fld>
             <a:endParaRPr lang="zh-CN" altLang="en-US"/>
           </a:p>
@@ -1131,7 +1134,7 @@
           <a:p>
             <a:fld id="{6C74CE78-F553-4499-92C2-23A3FC286B13}" type="datetime1">
               <a:rPr lang="zh-CN" altLang="en-US" smtClean="0"/>
-              <a:t>2017/10/11</a:t>
+              <a:t>2017/10/13</a:t>
             </a:fld>
             <a:endParaRPr lang="zh-CN" altLang="en-US"/>
           </a:p>
@@ -1297,7 +1300,7 @@
           <a:p>
             <a:fld id="{61040DCD-6B6B-467E-B707-39CD5F9CB825}" type="datetime1">
               <a:rPr lang="zh-CN" altLang="en-US" smtClean="0"/>
-              <a:t>2017/10/11</a:t>
+              <a:t>2017/10/13</a:t>
             </a:fld>
             <a:endParaRPr lang="zh-CN" altLang="en-US"/>
           </a:p>
@@ -1473,7 +1476,7 @@
           <a:p>
             <a:fld id="{8D983A4A-2C2A-4D8E-A43C-BC6DD092E5EC}" type="datetime1">
               <a:rPr lang="zh-CN" altLang="en-US" smtClean="0"/>
-              <a:t>2017/10/11</a:t>
+              <a:t>2017/10/13</a:t>
             </a:fld>
             <a:endParaRPr lang="zh-CN" altLang="en-US"/>
           </a:p>
@@ -1566,7 +1569,7 @@
           <a:p>
             <a:fld id="{AD4383D2-8C55-4FC0-9B0B-549F41BCB586}" type="datetime1">
               <a:rPr lang="zh-CN" altLang="en-US" smtClean="0"/>
-              <a:t>2017/10/11</a:t>
+              <a:t>2017/10/13</a:t>
             </a:fld>
             <a:endParaRPr lang="zh-CN" altLang="en-US"/>
           </a:p>
@@ -3686,7 +3689,7 @@
           <a:p>
             <a:fld id="{F138C28D-461B-46EA-B3D2-4CEA4CCF97FD}" type="datetime1">
               <a:rPr lang="zh-CN" altLang="en-US" smtClean="0"/>
-              <a:t>2017/10/11</a:t>
+              <a:t>2017/10/13</a:t>
             </a:fld>
             <a:endParaRPr lang="zh-CN" altLang="en-US"/>
           </a:p>
@@ -3915,7 +3918,7 @@
           <a:p>
             <a:fld id="{F138C28D-461B-46EA-B3D2-4CEA4CCF97FD}" type="datetime1">
               <a:rPr lang="zh-CN" altLang="en-US" smtClean="0"/>
-              <a:t>2017/10/11</a:t>
+              <a:t>2017/10/13</a:t>
             </a:fld>
             <a:endParaRPr lang="zh-CN" altLang="en-US"/>
           </a:p>
@@ -4310,7 +4313,7 @@
           <a:p>
             <a:fld id="{34E4DED1-77D9-4993-B7E5-C145AD9B215D}" type="datetime1">
               <a:rPr lang="zh-CN" altLang="en-US" smtClean="0"/>
-              <a:t>2017/10/11</a:t>
+              <a:t>2017/10/13</a:t>
             </a:fld>
             <a:endParaRPr lang="zh-CN" altLang="en-US"/>
           </a:p>
@@ -4727,7 +4730,7 @@
           <a:p>
             <a:fld id="{CB18C625-6BB2-4F84-B1CE-FBF94B9F79BE}" type="datetime1">
               <a:rPr lang="zh-CN" altLang="en-US" smtClean="0"/>
-              <a:t>2017/10/11</a:t>
+              <a:t>2017/10/13</a:t>
             </a:fld>
             <a:endParaRPr lang="zh-CN" altLang="en-US"/>
           </a:p>
@@ -4842,7 +4845,7 @@
           <a:p>
             <a:fld id="{AFB4DA66-5C86-4F23-BA06-D44CFE63E251}" type="datetime1">
               <a:rPr lang="zh-CN" altLang="en-US" smtClean="0"/>
-              <a:t>2017/10/11</a:t>
+              <a:t>2017/10/13</a:t>
             </a:fld>
             <a:endParaRPr lang="zh-CN" altLang="en-US"/>
           </a:p>
@@ -4935,7 +4938,7 @@
           <a:p>
             <a:fld id="{0CC55E60-CF45-4A5A-BD1C-DE3F0FBBE8F7}" type="datetime1">
               <a:rPr lang="zh-CN" altLang="en-US" smtClean="0"/>
-              <a:t>2017/10/11</a:t>
+              <a:t>2017/10/13</a:t>
             </a:fld>
             <a:endParaRPr lang="zh-CN" altLang="en-US"/>
           </a:p>
@@ -5208,7 +5211,7 @@
           <a:p>
             <a:fld id="{34741085-45D3-4EE8-874F-28448E75DCCF}" type="datetime1">
               <a:rPr lang="zh-CN" altLang="en-US" smtClean="0"/>
-              <a:t>2017/10/11</a:t>
+              <a:t>2017/10/13</a:t>
             </a:fld>
             <a:endParaRPr lang="zh-CN" altLang="en-US"/>
           </a:p>
@@ -5417,7 +5420,7 @@
           <a:p>
             <a:fld id="{1DA76A01-8161-42EC-A09B-C09924CBD308}" type="datetime1">
               <a:rPr lang="zh-CN" altLang="en-US" smtClean="0"/>
-              <a:t>2017/10/11</a:t>
+              <a:t>2017/10/13</a:t>
             </a:fld>
             <a:endParaRPr lang="zh-CN" altLang="en-US"/>
           </a:p>
@@ -5895,7 +5898,7 @@
           <a:p>
             <a:fld id="{D0BD8123-259D-4263-9F09-52A2460CC7EC}" type="datetime1">
               <a:rPr lang="zh-CN" altLang="en-US" smtClean="0"/>
-              <a:t>2017/10/11</a:t>
+              <a:t>2017/10/13</a:t>
             </a:fld>
             <a:endParaRPr lang="zh-CN" altLang="en-US"/>
           </a:p>
@@ -6011,7 +6014,7 @@
           <a:p>
             <a:fld id="{F138C28D-461B-46EA-B3D2-4CEA4CCF97FD}" type="datetime1">
               <a:rPr lang="zh-CN" altLang="en-US" smtClean="0"/>
-              <a:t>2017/10/11</a:t>
+              <a:t>2017/10/13</a:t>
             </a:fld>
             <a:endParaRPr lang="zh-CN" altLang="en-US" dirty="0"/>
           </a:p>
@@ -7787,7 +7790,7 @@
           <a:p>
             <a:fld id="{F138C28D-461B-46EA-B3D2-4CEA4CCF97FD}" type="datetime1">
               <a:rPr lang="zh-CN" altLang="en-US" smtClean="0"/>
-              <a:t>2017/10/11</a:t>
+              <a:t>2017/10/13</a:t>
             </a:fld>
             <a:endParaRPr lang="zh-CN" altLang="en-US"/>
           </a:p>
@@ -10154,7 +10157,7 @@
           <a:p>
             <a:fld id="{F138C28D-461B-46EA-B3D2-4CEA4CCF97FD}" type="datetime1">
               <a:rPr lang="zh-CN" altLang="en-US" smtClean="0"/>
-              <a:t>2017/10/11</a:t>
+              <a:t>2017/10/13</a:t>
             </a:fld>
             <a:endParaRPr lang="zh-CN" altLang="en-US"/>
           </a:p>
@@ -14302,7 +14305,7 @@
           <a:p>
             <a:fld id="{AD4383D2-8C55-4FC0-9B0B-549F41BCB586}" type="datetime1">
               <a:rPr lang="zh-CN" altLang="en-US" smtClean="0"/>
-              <a:t>2017/10/11</a:t>
+              <a:t>2017/10/13</a:t>
             </a:fld>
             <a:endParaRPr lang="zh-CN" altLang="en-US"/>
           </a:p>
@@ -14541,7 +14544,7 @@
           <a:p>
             <a:fld id="{F138C28D-461B-46EA-B3D2-4CEA4CCF97FD}" type="datetime1">
               <a:rPr lang="zh-CN" altLang="en-US" smtClean="0"/>
-              <a:t>2017/10/11</a:t>
+              <a:t>2017/10/13</a:t>
             </a:fld>
             <a:endParaRPr lang="zh-CN" altLang="en-US"/>
           </a:p>
@@ -15965,7 +15968,7 @@
           <a:p>
             <a:fld id="{F138C28D-461B-46EA-B3D2-4CEA4CCF97FD}" type="datetime1">
               <a:rPr lang="zh-CN" altLang="en-US" smtClean="0"/>
-              <a:t>2017/10/11</a:t>
+              <a:t>2017/10/13</a:t>
             </a:fld>
             <a:endParaRPr lang="zh-CN" altLang="en-US"/>
           </a:p>
@@ -21949,7 +21952,7 @@
           <a:p>
             <a:fld id="{F138C28D-461B-46EA-B3D2-4CEA4CCF97FD}" type="datetime1">
               <a:rPr lang="zh-CN" altLang="en-US" smtClean="0"/>
-              <a:t>2017/10/11</a:t>
+              <a:t>2017/10/13</a:t>
             </a:fld>
             <a:endParaRPr lang="zh-CN" altLang="en-US"/>
           </a:p>
@@ -22155,7 +22158,7 @@
           <a:p>
             <a:fld id="{F138C28D-461B-46EA-B3D2-4CEA4CCF97FD}" type="datetime1">
               <a:rPr lang="zh-CN" altLang="en-US" smtClean="0"/>
-              <a:t>2017/10/11</a:t>
+              <a:t>2017/10/13</a:t>
             </a:fld>
             <a:endParaRPr lang="zh-CN" altLang="en-US"/>
           </a:p>
@@ -23147,7 +23150,7 @@
           <a:p>
             <a:fld id="{4C59F49D-EEE6-4EC6-B33B-6C7AD1AA5DC5}" type="datetime1">
               <a:rPr lang="zh-CN" altLang="en-US" smtClean="0"/>
-              <a:t>2017/10/11</a:t>
+              <a:t>2017/10/13</a:t>
             </a:fld>
             <a:endParaRPr lang="zh-CN" altLang="en-US"/>
           </a:p>
@@ -23363,7 +23366,7 @@
           <a:p>
             <a:fld id="{F138C28D-461B-46EA-B3D2-4CEA4CCF97FD}" type="datetime1">
               <a:rPr lang="zh-CN" altLang="en-US" smtClean="0"/>
-              <a:t>2017/10/11</a:t>
+              <a:t>2017/10/13</a:t>
             </a:fld>
             <a:endParaRPr lang="zh-CN" altLang="en-US"/>
           </a:p>
@@ -23585,7 +23588,7 @@
           <a:p>
             <a:fld id="{F138C28D-461B-46EA-B3D2-4CEA4CCF97FD}" type="datetime1">
               <a:rPr lang="zh-CN" altLang="en-US" smtClean="0"/>
-              <a:t>2017/10/11</a:t>
+              <a:t>2017/10/13</a:t>
             </a:fld>
             <a:endParaRPr lang="zh-CN" altLang="en-US"/>
           </a:p>
@@ -24480,7 +24483,7 @@
           <a:p>
             <a:fld id="{AD4383D2-8C55-4FC0-9B0B-549F41BCB586}" type="datetime1">
               <a:rPr lang="zh-CN" altLang="en-US" smtClean="0"/>
-              <a:t>2017/10/11</a:t>
+              <a:t>2017/10/13</a:t>
             </a:fld>
             <a:endParaRPr lang="zh-CN" altLang="en-US"/>
           </a:p>
@@ -24719,7 +24722,7 @@
           <a:p>
             <a:fld id="{F138C28D-461B-46EA-B3D2-4CEA4CCF97FD}" type="datetime1">
               <a:rPr lang="zh-CN" altLang="en-US" smtClean="0"/>
-              <a:t>2017/10/11</a:t>
+              <a:t>2017/10/13</a:t>
             </a:fld>
             <a:endParaRPr lang="zh-CN" altLang="en-US"/>
           </a:p>
@@ -25806,7 +25809,7 @@
           <a:p>
             <a:fld id="{F138C28D-461B-46EA-B3D2-4CEA4CCF97FD}" type="datetime1">
               <a:rPr lang="zh-CN" altLang="en-US" smtClean="0"/>
-              <a:t>2017/10/11</a:t>
+              <a:t>2017/10/13</a:t>
             </a:fld>
             <a:endParaRPr lang="zh-CN" altLang="en-US"/>
           </a:p>
@@ -27631,7 +27634,7 @@
           <a:p>
             <a:fld id="{AD4383D2-8C55-4FC0-9B0B-549F41BCB586}" type="datetime1">
               <a:rPr lang="zh-CN" altLang="en-US" smtClean="0"/>
-              <a:t>2017/10/11</a:t>
+              <a:t>2017/10/13</a:t>
             </a:fld>
             <a:endParaRPr lang="zh-CN" altLang="en-US" dirty="0"/>
           </a:p>
@@ -28767,7 +28770,7 @@
           <a:p>
             <a:fld id="{F138C28D-461B-46EA-B3D2-4CEA4CCF97FD}" type="datetime1">
               <a:rPr lang="zh-CN" altLang="en-US" smtClean="0"/>
-              <a:t>2017/10/11</a:t>
+              <a:t>2017/10/13</a:t>
             </a:fld>
             <a:endParaRPr lang="zh-CN" altLang="en-US"/>
           </a:p>

</xml_diff>

<commit_message>
Ray tracing can be compiled
</commit_message>
<xml_diff>
--- a/docs/Scene/SceneExplanation.pptx
+++ b/docs/Scene/SceneExplanation.pptx
@@ -246,7 +246,7 @@
           <a:p>
             <a:fld id="{6D7FE9F8-2CA7-468D-9335-DE6E4EE2CFE0}" type="datetimeFigureOut">
               <a:rPr lang="zh-CN" altLang="en-US" smtClean="0"/>
-              <a:t>2017/10/24</a:t>
+              <a:t>2017/10/25</a:t>
             </a:fld>
             <a:endParaRPr lang="zh-CN" altLang="en-US"/>
           </a:p>
@@ -423,7 +423,7 @@
           <a:p>
             <a:fld id="{2E3B1B48-C3D3-44FD-8F18-EE819032FA56}" type="datetimeFigureOut">
               <a:rPr lang="zh-CN" altLang="en-US" smtClean="0"/>
-              <a:t>2017/10/24</a:t>
+              <a:t>2017/10/25</a:t>
             </a:fld>
             <a:endParaRPr lang="zh-CN" altLang="en-US"/>
           </a:p>
@@ -884,7 +884,7 @@
           <a:p>
             <a:fld id="{9082C258-E36B-4428-9EBE-3D66F397061D}" type="datetime1">
               <a:rPr lang="zh-CN" altLang="en-US" smtClean="0"/>
-              <a:t>2017/10/24</a:t>
+              <a:t>2017/10/25</a:t>
             </a:fld>
             <a:endParaRPr lang="zh-CN" altLang="en-US"/>
           </a:p>
@@ -1134,7 +1134,7 @@
           <a:p>
             <a:fld id="{6C74CE78-F553-4499-92C2-23A3FC286B13}" type="datetime1">
               <a:rPr lang="zh-CN" altLang="en-US" smtClean="0"/>
-              <a:t>2017/10/24</a:t>
+              <a:t>2017/10/25</a:t>
             </a:fld>
             <a:endParaRPr lang="zh-CN" altLang="en-US"/>
           </a:p>
@@ -1300,7 +1300,7 @@
           <a:p>
             <a:fld id="{61040DCD-6B6B-467E-B707-39CD5F9CB825}" type="datetime1">
               <a:rPr lang="zh-CN" altLang="en-US" smtClean="0"/>
-              <a:t>2017/10/24</a:t>
+              <a:t>2017/10/25</a:t>
             </a:fld>
             <a:endParaRPr lang="zh-CN" altLang="en-US"/>
           </a:p>
@@ -1476,7 +1476,7 @@
           <a:p>
             <a:fld id="{8D983A4A-2C2A-4D8E-A43C-BC6DD092E5EC}" type="datetime1">
               <a:rPr lang="zh-CN" altLang="en-US" smtClean="0"/>
-              <a:t>2017/10/24</a:t>
+              <a:t>2017/10/25</a:t>
             </a:fld>
             <a:endParaRPr lang="zh-CN" altLang="en-US"/>
           </a:p>
@@ -1569,7 +1569,7 @@
           <a:p>
             <a:fld id="{AD4383D2-8C55-4FC0-9B0B-549F41BCB586}" type="datetime1">
               <a:rPr lang="zh-CN" altLang="en-US" smtClean="0"/>
-              <a:t>2017/10/24</a:t>
+              <a:t>2017/10/25</a:t>
             </a:fld>
             <a:endParaRPr lang="zh-CN" altLang="en-US"/>
           </a:p>
@@ -3689,7 +3689,7 @@
           <a:p>
             <a:fld id="{F138C28D-461B-46EA-B3D2-4CEA4CCF97FD}" type="datetime1">
               <a:rPr lang="zh-CN" altLang="en-US" smtClean="0"/>
-              <a:t>2017/10/24</a:t>
+              <a:t>2017/10/25</a:t>
             </a:fld>
             <a:endParaRPr lang="zh-CN" altLang="en-US"/>
           </a:p>
@@ -3918,7 +3918,7 @@
           <a:p>
             <a:fld id="{F138C28D-461B-46EA-B3D2-4CEA4CCF97FD}" type="datetime1">
               <a:rPr lang="zh-CN" altLang="en-US" smtClean="0"/>
-              <a:t>2017/10/24</a:t>
+              <a:t>2017/10/25</a:t>
             </a:fld>
             <a:endParaRPr lang="zh-CN" altLang="en-US"/>
           </a:p>
@@ -4313,7 +4313,7 @@
           <a:p>
             <a:fld id="{34E4DED1-77D9-4993-B7E5-C145AD9B215D}" type="datetime1">
               <a:rPr lang="zh-CN" altLang="en-US" smtClean="0"/>
-              <a:t>2017/10/24</a:t>
+              <a:t>2017/10/25</a:t>
             </a:fld>
             <a:endParaRPr lang="zh-CN" altLang="en-US"/>
           </a:p>
@@ -4730,7 +4730,7 @@
           <a:p>
             <a:fld id="{CB18C625-6BB2-4F84-B1CE-FBF94B9F79BE}" type="datetime1">
               <a:rPr lang="zh-CN" altLang="en-US" smtClean="0"/>
-              <a:t>2017/10/24</a:t>
+              <a:t>2017/10/25</a:t>
             </a:fld>
             <a:endParaRPr lang="zh-CN" altLang="en-US"/>
           </a:p>
@@ -4845,7 +4845,7 @@
           <a:p>
             <a:fld id="{AFB4DA66-5C86-4F23-BA06-D44CFE63E251}" type="datetime1">
               <a:rPr lang="zh-CN" altLang="en-US" smtClean="0"/>
-              <a:t>2017/10/24</a:t>
+              <a:t>2017/10/25</a:t>
             </a:fld>
             <a:endParaRPr lang="zh-CN" altLang="en-US"/>
           </a:p>
@@ -4938,7 +4938,7 @@
           <a:p>
             <a:fld id="{0CC55E60-CF45-4A5A-BD1C-DE3F0FBBE8F7}" type="datetime1">
               <a:rPr lang="zh-CN" altLang="en-US" smtClean="0"/>
-              <a:t>2017/10/24</a:t>
+              <a:t>2017/10/25</a:t>
             </a:fld>
             <a:endParaRPr lang="zh-CN" altLang="en-US"/>
           </a:p>
@@ -5211,7 +5211,7 @@
           <a:p>
             <a:fld id="{34741085-45D3-4EE8-874F-28448E75DCCF}" type="datetime1">
               <a:rPr lang="zh-CN" altLang="en-US" smtClean="0"/>
-              <a:t>2017/10/24</a:t>
+              <a:t>2017/10/25</a:t>
             </a:fld>
             <a:endParaRPr lang="zh-CN" altLang="en-US"/>
           </a:p>
@@ -5420,7 +5420,7 @@
           <a:p>
             <a:fld id="{1DA76A01-8161-42EC-A09B-C09924CBD308}" type="datetime1">
               <a:rPr lang="zh-CN" altLang="en-US" smtClean="0"/>
-              <a:t>2017/10/24</a:t>
+              <a:t>2017/10/25</a:t>
             </a:fld>
             <a:endParaRPr lang="zh-CN" altLang="en-US"/>
           </a:p>
@@ -5898,7 +5898,7 @@
           <a:p>
             <a:fld id="{D0BD8123-259D-4263-9F09-52A2460CC7EC}" type="datetime1">
               <a:rPr lang="zh-CN" altLang="en-US" smtClean="0"/>
-              <a:t>2017/10/24</a:t>
+              <a:t>2017/10/25</a:t>
             </a:fld>
             <a:endParaRPr lang="zh-CN" altLang="en-US"/>
           </a:p>
@@ -6014,7 +6014,7 @@
           <a:p>
             <a:fld id="{F138C28D-461B-46EA-B3D2-4CEA4CCF97FD}" type="datetime1">
               <a:rPr lang="zh-CN" altLang="en-US" smtClean="0"/>
-              <a:t>2017/10/24</a:t>
+              <a:t>2017/10/25</a:t>
             </a:fld>
             <a:endParaRPr lang="zh-CN" altLang="en-US" dirty="0"/>
           </a:p>
@@ -7791,7 +7791,7 @@
           <a:p>
             <a:fld id="{F138C28D-461B-46EA-B3D2-4CEA4CCF97FD}" type="datetime1">
               <a:rPr lang="zh-CN" altLang="en-US" smtClean="0"/>
-              <a:t>2017/10/24</a:t>
+              <a:t>2017/10/25</a:t>
             </a:fld>
             <a:endParaRPr lang="zh-CN" altLang="en-US"/>
           </a:p>
@@ -7901,7 +7901,7 @@
           <p:nvPr>
             <p:extLst>
               <p:ext uri="{D42A27DB-BD31-4B8C-83A1-F6EECF244321}">
-                <p14:modId xmlns:p14="http://schemas.microsoft.com/office/powerpoint/2010/main" val="3223902649"/>
+                <p14:modId xmlns:p14="http://schemas.microsoft.com/office/powerpoint/2010/main" val="586539658"/>
               </p:ext>
             </p:extLst>
           </p:nvPr>
@@ -8456,6 +8456,9 @@
                       </a:r>
                       <a:r>
                         <a:rPr lang="en-US" altLang="zh-CN" sz="1600" dirty="0">
+                          <a:solidFill>
+                            <a:srgbClr val="FF0000"/>
+                          </a:solidFill>
                           <a:latin typeface="Times New Roman" panose="02020603050405020304" pitchFamily="18" charset="0"/>
                           <a:cs typeface="Times New Roman" panose="02020603050405020304" pitchFamily="18" charset="0"/>
                         </a:rPr>
@@ -8463,6 +8466,9 @@
                       </a:r>
                       <a:r>
                         <a:rPr lang="zh-CN" altLang="en-US" sz="1600" dirty="0">
+                          <a:solidFill>
+                            <a:srgbClr val="FF0000"/>
+                          </a:solidFill>
                           <a:latin typeface="Times New Roman" panose="02020603050405020304" pitchFamily="18" charset="0"/>
                           <a:cs typeface="Times New Roman" panose="02020603050405020304" pitchFamily="18" charset="0"/>
                         </a:rPr>
@@ -8470,12 +8476,18 @@
                       </a:r>
                       <a:r>
                         <a:rPr lang="en-US" altLang="zh-CN" sz="1600" dirty="0">
+                          <a:solidFill>
+                            <a:srgbClr val="FF0000"/>
+                          </a:solidFill>
                           <a:latin typeface="Times New Roman" panose="02020603050405020304" pitchFamily="18" charset="0"/>
                           <a:cs typeface="Times New Roman" panose="02020603050405020304" pitchFamily="18" charset="0"/>
                         </a:rPr>
                         <a:t>z</a:t>
                       </a:r>
                       <a:endParaRPr lang="zh-CN" altLang="en-US" sz="1600" dirty="0">
+                        <a:solidFill>
+                          <a:srgbClr val="FF0000"/>
+                        </a:solidFill>
                         <a:latin typeface="Times New Roman" panose="02020603050405020304" pitchFamily="18" charset="0"/>
                         <a:cs typeface="Times New Roman" panose="02020603050405020304" pitchFamily="18" charset="0"/>
                       </a:endParaRPr>
@@ -10158,7 +10170,7 @@
           <a:p>
             <a:fld id="{F138C28D-461B-46EA-B3D2-4CEA4CCF97FD}" type="datetime1">
               <a:rPr lang="zh-CN" altLang="en-US" smtClean="0"/>
-              <a:t>2017/10/24</a:t>
+              <a:t>2017/10/25</a:t>
             </a:fld>
             <a:endParaRPr lang="zh-CN" altLang="en-US"/>
           </a:p>
@@ -14407,7 +14419,7 @@
           <a:p>
             <a:fld id="{AD4383D2-8C55-4FC0-9B0B-549F41BCB586}" type="datetime1">
               <a:rPr lang="zh-CN" altLang="en-US" smtClean="0"/>
-              <a:t>2017/10/24</a:t>
+              <a:t>2017/10/25</a:t>
             </a:fld>
             <a:endParaRPr lang="zh-CN" altLang="en-US"/>
           </a:p>
@@ -14646,7 +14658,7 @@
           <a:p>
             <a:fld id="{F138C28D-461B-46EA-B3D2-4CEA4CCF97FD}" type="datetime1">
               <a:rPr lang="zh-CN" altLang="en-US" smtClean="0"/>
-              <a:t>2017/10/24</a:t>
+              <a:t>2017/10/25</a:t>
             </a:fld>
             <a:endParaRPr lang="zh-CN" altLang="en-US"/>
           </a:p>
@@ -16164,7 +16176,7 @@
           <a:p>
             <a:fld id="{F138C28D-461B-46EA-B3D2-4CEA4CCF97FD}" type="datetime1">
               <a:rPr lang="zh-CN" altLang="en-US" smtClean="0"/>
-              <a:t>2017/10/24</a:t>
+              <a:t>2017/10/25</a:t>
             </a:fld>
             <a:endParaRPr lang="zh-CN" altLang="en-US"/>
           </a:p>
@@ -23492,7 +23504,7 @@
           <a:p>
             <a:fld id="{F138C28D-461B-46EA-B3D2-4CEA4CCF97FD}" type="datetime1">
               <a:rPr lang="zh-CN" altLang="en-US" smtClean="0"/>
-              <a:t>2017/10/24</a:t>
+              <a:t>2017/10/25</a:t>
             </a:fld>
             <a:endParaRPr lang="zh-CN" altLang="en-US"/>
           </a:p>
@@ -23698,7 +23710,7 @@
           <a:p>
             <a:fld id="{F138C28D-461B-46EA-B3D2-4CEA4CCF97FD}" type="datetime1">
               <a:rPr lang="zh-CN" altLang="en-US" smtClean="0"/>
-              <a:t>2017/10/24</a:t>
+              <a:t>2017/10/25</a:t>
             </a:fld>
             <a:endParaRPr lang="zh-CN" altLang="en-US"/>
           </a:p>
@@ -24690,7 +24702,7 @@
           <a:p>
             <a:fld id="{4C59F49D-EEE6-4EC6-B33B-6C7AD1AA5DC5}" type="datetime1">
               <a:rPr lang="zh-CN" altLang="en-US" smtClean="0"/>
-              <a:t>2017/10/24</a:t>
+              <a:t>2017/10/25</a:t>
             </a:fld>
             <a:endParaRPr lang="zh-CN" altLang="en-US"/>
           </a:p>
@@ -24906,7 +24918,7 @@
           <a:p>
             <a:fld id="{F138C28D-461B-46EA-B3D2-4CEA4CCF97FD}" type="datetime1">
               <a:rPr lang="zh-CN" altLang="en-US" smtClean="0"/>
-              <a:t>2017/10/24</a:t>
+              <a:t>2017/10/25</a:t>
             </a:fld>
             <a:endParaRPr lang="zh-CN" altLang="en-US"/>
           </a:p>
@@ -25128,7 +25140,7 @@
           <a:p>
             <a:fld id="{F138C28D-461B-46EA-B3D2-4CEA4CCF97FD}" type="datetime1">
               <a:rPr lang="zh-CN" altLang="en-US" smtClean="0"/>
-              <a:t>2017/10/24</a:t>
+              <a:t>2017/10/25</a:t>
             </a:fld>
             <a:endParaRPr lang="zh-CN" altLang="en-US"/>
           </a:p>
@@ -26023,7 +26035,7 @@
           <a:p>
             <a:fld id="{AD4383D2-8C55-4FC0-9B0B-549F41BCB586}" type="datetime1">
               <a:rPr lang="zh-CN" altLang="en-US" smtClean="0"/>
-              <a:t>2017/10/24</a:t>
+              <a:t>2017/10/25</a:t>
             </a:fld>
             <a:endParaRPr lang="zh-CN" altLang="en-US"/>
           </a:p>
@@ -26262,7 +26274,7 @@
           <a:p>
             <a:fld id="{F138C28D-461B-46EA-B3D2-4CEA4CCF97FD}" type="datetime1">
               <a:rPr lang="zh-CN" altLang="en-US" smtClean="0"/>
-              <a:t>2017/10/24</a:t>
+              <a:t>2017/10/25</a:t>
             </a:fld>
             <a:endParaRPr lang="zh-CN" altLang="en-US"/>
           </a:p>
@@ -27349,7 +27361,7 @@
           <a:p>
             <a:fld id="{F138C28D-461B-46EA-B3D2-4CEA4CCF97FD}" type="datetime1">
               <a:rPr lang="zh-CN" altLang="en-US" smtClean="0"/>
-              <a:t>2017/10/24</a:t>
+              <a:t>2017/10/25</a:t>
             </a:fld>
             <a:endParaRPr lang="zh-CN" altLang="en-US"/>
           </a:p>
@@ -29174,7 +29186,7 @@
           <a:p>
             <a:fld id="{AD4383D2-8C55-4FC0-9B0B-549F41BCB586}" type="datetime1">
               <a:rPr lang="zh-CN" altLang="en-US" smtClean="0"/>
-              <a:t>2017/10/24</a:t>
+              <a:t>2017/10/25</a:t>
             </a:fld>
             <a:endParaRPr lang="zh-CN" altLang="en-US" dirty="0"/>
           </a:p>
@@ -30310,7 +30322,7 @@
           <a:p>
             <a:fld id="{F138C28D-461B-46EA-B3D2-4CEA4CCF97FD}" type="datetime1">
               <a:rPr lang="zh-CN" altLang="en-US" smtClean="0"/>
-              <a:t>2017/10/24</a:t>
+              <a:t>2017/10/25</a:t>
             </a:fld>
             <a:endParaRPr lang="zh-CN" altLang="en-US"/>
           </a:p>

</xml_diff>